<commit_message>
Adds examples on Variable types and Methods
</commit_message>
<xml_diff>
--- a/slides/Selenium, Module3.pptx
+++ b/slides/Selenium, Module3.pptx
@@ -5,7 +5,7 @@
     <p:sldMasterId id="2147483664" r:id="rId1"/>
   </p:sldMasterIdLst>
   <p:notesMasterIdLst>
-    <p:notesMasterId r:id="rId21"/>
+    <p:notesMasterId r:id="rId22"/>
   </p:notesMasterIdLst>
   <p:sldIdLst>
     <p:sldId id="256" r:id="rId2"/>
@@ -26,7 +26,8 @@
     <p:sldId id="282" r:id="rId17"/>
     <p:sldId id="283" r:id="rId18"/>
     <p:sldId id="284" r:id="rId19"/>
-    <p:sldId id="276" r:id="rId20"/>
+    <p:sldId id="285" r:id="rId20"/>
+    <p:sldId id="276" r:id="rId21"/>
   </p:sldIdLst>
   <p:sldSz cx="12192000" cy="6858000"/>
   <p:notesSz cx="6858000" cy="9144000"/>
@@ -27728,7 +27729,7 @@
   <p:cSld>
     <p:spTree>
       <p:nvGrpSpPr>
-        <p:cNvPr id="1" name="Shape 273"/>
+        <p:cNvPr id="1" name=""/>
         <p:cNvGrpSpPr/>
         <p:nvPr/>
       </p:nvGrpSpPr>
@@ -27742,309 +27743,75 @@
       </p:grpSpPr>
       <p:sp>
         <p:nvSpPr>
-          <p:cNvPr id="274" name="Shape 274"/>
-          <p:cNvSpPr txBox="1">
+          <p:cNvPr id="2" name="Title 1">
+            <a:extLst>
+              <a:ext uri="{FF2B5EF4-FFF2-40B4-BE49-F238E27FC236}">
+                <a16:creationId xmlns:a16="http://schemas.microsoft.com/office/drawing/2014/main" id="{3AC90361-CF6F-8243-B62D-9B8337411582}"/>
+              </a:ext>
+            </a:extLst>
+          </p:cNvPr>
+          <p:cNvSpPr>
             <a:spLocks noGrp="1"/>
           </p:cNvSpPr>
           <p:nvPr>
             <p:ph type="title"/>
           </p:nvPr>
         </p:nvSpPr>
-        <p:spPr>
-          <a:xfrm>
-            <a:off x="677334" y="609600"/>
-            <a:ext cx="8596800" cy="1320900"/>
-          </a:xfrm>
-          <a:prstGeom prst="rect">
-            <a:avLst/>
-          </a:prstGeom>
-        </p:spPr>
+        <p:spPr/>
         <p:txBody>
-          <a:bodyPr spcFirstLastPara="1" wrap="square" lIns="91425" tIns="91425" rIns="91425" bIns="91425" anchor="t" anchorCtr="0">
-            <a:noAutofit/>
-          </a:bodyPr>
+          <a:bodyPr/>
           <a:lstStyle/>
           <a:p>
-            <a:pPr marL="0" lvl="0" indent="0">
-              <a:spcBef>
-                <a:spcPts val="0"/>
-              </a:spcBef>
-              <a:spcAft>
-                <a:spcPts val="0"/>
-              </a:spcAft>
-              <a:buNone/>
-            </a:pPr>
             <a:r>
-              <a:rPr lang="es-ES"/>
-              <a:t>Constructores</a:t>
+              <a:rPr lang="en-MX" dirty="0"/>
+              <a:t>Estado y Comportamiento</a:t>
             </a:r>
-            <a:endParaRPr/>
           </a:p>
         </p:txBody>
       </p:sp>
       <p:sp>
         <p:nvSpPr>
-          <p:cNvPr id="275" name="Shape 275"/>
-          <p:cNvSpPr txBox="1">
+          <p:cNvPr id="3" name="Text Placeholder 2">
+            <a:extLst>
+              <a:ext uri="{FF2B5EF4-FFF2-40B4-BE49-F238E27FC236}">
+                <a16:creationId xmlns:a16="http://schemas.microsoft.com/office/drawing/2014/main" id="{D0C8FE9D-676F-5046-AF9E-B287FDA1EF63}"/>
+              </a:ext>
+            </a:extLst>
+          </p:cNvPr>
+          <p:cNvSpPr>
             <a:spLocks noGrp="1"/>
           </p:cNvSpPr>
           <p:nvPr>
             <p:ph type="body" idx="1"/>
           </p:nvPr>
         </p:nvSpPr>
-        <p:spPr>
-          <a:xfrm>
-            <a:off x="677334" y="2160589"/>
-            <a:ext cx="8596800" cy="3880800"/>
-          </a:xfrm>
-          <a:prstGeom prst="rect">
-            <a:avLst/>
-          </a:prstGeom>
-        </p:spPr>
+        <p:spPr/>
         <p:txBody>
-          <a:bodyPr spcFirstLastPara="1" wrap="square" lIns="91425" tIns="91425" rIns="91425" bIns="91425" anchor="t" anchorCtr="0">
-            <a:noAutofit/>
-          </a:bodyPr>
+          <a:bodyPr/>
           <a:lstStyle/>
           <a:p>
-            <a:pPr marL="342900" lvl="0" indent="-251459">
-              <a:spcBef>
-                <a:spcPts val="1000"/>
-              </a:spcBef>
-              <a:spcAft>
-                <a:spcPts val="0"/>
-              </a:spcAft>
-              <a:buNone/>
-            </a:pPr>
             <a:r>
-              <a:rPr lang="es-ES" dirty="0" err="1"/>
-              <a:t>public</a:t>
+              <a:rPr lang="en-MX" dirty="0"/>
+              <a:t>El estado de un objeto lo representan sus atributos</a:t>
             </a:r>
-            <a:r>
-              <a:rPr lang="es-ES" dirty="0"/>
-              <a:t> </a:t>
-            </a:r>
-            <a:r>
-              <a:rPr lang="es-ES" dirty="0" err="1"/>
-              <a:t>class</a:t>
-            </a:r>
-            <a:r>
-              <a:rPr lang="es-ES" dirty="0"/>
-              <a:t> </a:t>
-            </a:r>
-            <a:r>
-              <a:rPr lang="es-ES" dirty="0" err="1"/>
-              <a:t>Baby</a:t>
-            </a:r>
-            <a:r>
-              <a:rPr lang="es-ES" dirty="0"/>
-              <a:t> { </a:t>
-            </a:r>
-            <a:endParaRPr dirty="0"/>
           </a:p>
           <a:p>
-            <a:pPr marL="342900" lvl="0" indent="-251459">
-              <a:spcBef>
-                <a:spcPts val="1000"/>
-              </a:spcBef>
-              <a:spcAft>
-                <a:spcPts val="0"/>
-              </a:spcAft>
-              <a:buNone/>
-            </a:pPr>
             <a:r>
-              <a:rPr lang="es-ES" dirty="0"/>
-              <a:t>    </a:t>
+              <a:rPr lang="en-MX"/>
+              <a:t>El comportamiento lo representan sus metodos</a:t>
             </a:r>
-            <a:r>
-              <a:rPr lang="es-ES" dirty="0" err="1"/>
-              <a:t>String</a:t>
-            </a:r>
-            <a:r>
-              <a:rPr lang="es-ES" dirty="0"/>
-              <a:t> </a:t>
-            </a:r>
-            <a:r>
-              <a:rPr lang="es-ES" dirty="0" err="1"/>
-              <a:t>name</a:t>
-            </a:r>
-            <a:r>
-              <a:rPr lang="es-ES" dirty="0"/>
-              <a:t>; </a:t>
-            </a:r>
-            <a:endParaRPr dirty="0"/>
           </a:p>
           <a:p>
-            <a:pPr marL="342900" lvl="0" indent="-251459">
-              <a:spcBef>
-                <a:spcPts val="1000"/>
-              </a:spcBef>
-              <a:spcAft>
-                <a:spcPts val="0"/>
-              </a:spcAft>
-              <a:buNone/>
-            </a:pPr>
-            <a:r>
-              <a:rPr lang="es-ES" dirty="0"/>
-              <a:t>    </a:t>
-            </a:r>
-            <a:r>
-              <a:rPr lang="es-ES" dirty="0" err="1"/>
-              <a:t>char</a:t>
-            </a:r>
-            <a:r>
-              <a:rPr lang="es-ES" dirty="0"/>
-              <a:t> sex; </a:t>
-            </a:r>
-            <a:endParaRPr dirty="0"/>
-          </a:p>
-          <a:p>
-            <a:pPr marL="342900" lvl="0" indent="-251459">
-              <a:spcBef>
-                <a:spcPts val="1000"/>
-              </a:spcBef>
-              <a:spcAft>
-                <a:spcPts val="0"/>
-              </a:spcAft>
-              <a:buNone/>
-            </a:pPr>
-            <a:r>
-              <a:rPr lang="es-ES" dirty="0"/>
-              <a:t>    </a:t>
-            </a:r>
-            <a:r>
-              <a:rPr lang="es-ES" dirty="0" err="1"/>
-              <a:t>Baby</a:t>
-            </a:r>
-            <a:r>
-              <a:rPr lang="es-ES" dirty="0"/>
-              <a:t>(</a:t>
-            </a:r>
-            <a:r>
-              <a:rPr lang="es-ES" dirty="0" err="1"/>
-              <a:t>String</a:t>
-            </a:r>
-            <a:r>
-              <a:rPr lang="es-ES" dirty="0"/>
-              <a:t> </a:t>
-            </a:r>
-            <a:r>
-              <a:rPr lang="es-ES" dirty="0" err="1"/>
-              <a:t>myMame</a:t>
-            </a:r>
-            <a:r>
-              <a:rPr lang="es-ES" dirty="0"/>
-              <a:t>, </a:t>
-            </a:r>
-            <a:r>
-              <a:rPr lang="es-ES" dirty="0" err="1"/>
-              <a:t>char</a:t>
-            </a:r>
-            <a:r>
-              <a:rPr lang="es-ES" dirty="0"/>
-              <a:t> </a:t>
-            </a:r>
-            <a:r>
-              <a:rPr lang="es-ES" dirty="0" err="1"/>
-              <a:t>babySex</a:t>
-            </a:r>
-            <a:r>
-              <a:rPr lang="es-ES" dirty="0"/>
-              <a:t>){ </a:t>
-            </a:r>
-            <a:endParaRPr dirty="0"/>
-          </a:p>
-          <a:p>
-            <a:pPr marL="342900" lvl="0" indent="-251459">
-              <a:spcBef>
-                <a:spcPts val="1000"/>
-              </a:spcBef>
-              <a:spcAft>
-                <a:spcPts val="0"/>
-              </a:spcAft>
-              <a:buNone/>
-            </a:pPr>
-            <a:r>
-              <a:rPr lang="es-ES" dirty="0"/>
-              <a:t>        </a:t>
-            </a:r>
-            <a:r>
-              <a:rPr lang="es-ES" dirty="0" err="1"/>
-              <a:t>name</a:t>
-            </a:r>
-            <a:r>
-              <a:rPr lang="es-ES" dirty="0"/>
-              <a:t> = </a:t>
-            </a:r>
-            <a:r>
-              <a:rPr lang="es-ES" dirty="0" err="1"/>
-              <a:t>myName</a:t>
-            </a:r>
-            <a:r>
-              <a:rPr lang="es-ES" dirty="0"/>
-              <a:t>; </a:t>
-            </a:r>
-            <a:endParaRPr dirty="0"/>
-          </a:p>
-          <a:p>
-            <a:pPr marL="342900" lvl="0" indent="-251459">
-              <a:spcBef>
-                <a:spcPts val="1000"/>
-              </a:spcBef>
-              <a:spcAft>
-                <a:spcPts val="0"/>
-              </a:spcAft>
-              <a:buNone/>
-            </a:pPr>
-            <a:r>
-              <a:rPr lang="es-ES" dirty="0"/>
-              <a:t>        sex = </a:t>
-            </a:r>
-            <a:r>
-              <a:rPr lang="es-ES" dirty="0" err="1"/>
-              <a:t>babySex</a:t>
-            </a:r>
-            <a:r>
-              <a:rPr lang="es-ES" dirty="0"/>
-              <a:t>; </a:t>
-            </a:r>
-            <a:endParaRPr dirty="0"/>
-          </a:p>
-          <a:p>
-            <a:pPr marL="342900" lvl="0" indent="-251459">
-              <a:spcBef>
-                <a:spcPts val="1000"/>
-              </a:spcBef>
-              <a:spcAft>
-                <a:spcPts val="0"/>
-              </a:spcAft>
-              <a:buNone/>
-            </a:pPr>
-            <a:r>
-              <a:rPr lang="es-ES" dirty="0"/>
-              <a:t>    } </a:t>
-            </a:r>
-            <a:endParaRPr dirty="0"/>
-          </a:p>
-          <a:p>
-            <a:pPr marL="342900" lvl="0" indent="-251459">
-              <a:spcBef>
-                <a:spcPts val="1000"/>
-              </a:spcBef>
-              <a:spcAft>
-                <a:spcPts val="0"/>
-              </a:spcAft>
-              <a:buNone/>
-            </a:pPr>
-            <a:r>
-              <a:rPr lang="es-ES" dirty="0"/>
-              <a:t>} </a:t>
-            </a:r>
-            <a:endParaRPr dirty="0"/>
+            <a:endParaRPr lang="en-MX"/>
           </a:p>
         </p:txBody>
       </p:sp>
     </p:spTree>
+    <p:extLst>
+      <p:ext uri="{BB962C8B-B14F-4D97-AF65-F5344CB8AC3E}">
+        <p14:creationId xmlns:p14="http://schemas.microsoft.com/office/powerpoint/2010/main" val="3283183202"/>
+      </p:ext>
+    </p:extLst>
   </p:cSld>
   <p:clrMapOvr>
     <a:masterClrMapping/>
@@ -28131,6 +27898,335 @@
         <p14:creationId xmlns:p14="http://schemas.microsoft.com/office/powerpoint/2010/main" val="2274694205"/>
       </p:ext>
     </p:extLst>
+  </p:cSld>
+  <p:clrMapOvr>
+    <a:masterClrMapping/>
+  </p:clrMapOvr>
+</p:sld>
+</file>
+
+<file path=ppt/slides/slide20.xml><?xml version="1.0" encoding="utf-8"?>
+<p:sld xmlns:a="http://schemas.openxmlformats.org/drawingml/2006/main" xmlns:r="http://schemas.openxmlformats.org/officeDocument/2006/relationships" xmlns:p="http://schemas.openxmlformats.org/presentationml/2006/main">
+  <p:cSld>
+    <p:spTree>
+      <p:nvGrpSpPr>
+        <p:cNvPr id="1" name="Shape 273"/>
+        <p:cNvGrpSpPr/>
+        <p:nvPr/>
+      </p:nvGrpSpPr>
+      <p:grpSpPr>
+        <a:xfrm>
+          <a:off x="0" y="0"/>
+          <a:ext cx="0" cy="0"/>
+          <a:chOff x="0" y="0"/>
+          <a:chExt cx="0" cy="0"/>
+        </a:xfrm>
+      </p:grpSpPr>
+      <p:sp>
+        <p:nvSpPr>
+          <p:cNvPr id="274" name="Shape 274"/>
+          <p:cNvSpPr txBox="1">
+            <a:spLocks noGrp="1"/>
+          </p:cNvSpPr>
+          <p:nvPr>
+            <p:ph type="title"/>
+          </p:nvPr>
+        </p:nvSpPr>
+        <p:spPr>
+          <a:xfrm>
+            <a:off x="677334" y="609600"/>
+            <a:ext cx="8596800" cy="1320900"/>
+          </a:xfrm>
+          <a:prstGeom prst="rect">
+            <a:avLst/>
+          </a:prstGeom>
+        </p:spPr>
+        <p:txBody>
+          <a:bodyPr spcFirstLastPara="1" wrap="square" lIns="91425" tIns="91425" rIns="91425" bIns="91425" anchor="t" anchorCtr="0">
+            <a:noAutofit/>
+          </a:bodyPr>
+          <a:lstStyle/>
+          <a:p>
+            <a:pPr marL="0" lvl="0" indent="0">
+              <a:spcBef>
+                <a:spcPts val="0"/>
+              </a:spcBef>
+              <a:spcAft>
+                <a:spcPts val="0"/>
+              </a:spcAft>
+              <a:buNone/>
+            </a:pPr>
+            <a:r>
+              <a:rPr lang="es-ES"/>
+              <a:t>Constructores</a:t>
+            </a:r>
+            <a:endParaRPr/>
+          </a:p>
+        </p:txBody>
+      </p:sp>
+      <p:sp>
+        <p:nvSpPr>
+          <p:cNvPr id="275" name="Shape 275"/>
+          <p:cNvSpPr txBox="1">
+            <a:spLocks noGrp="1"/>
+          </p:cNvSpPr>
+          <p:nvPr>
+            <p:ph type="body" idx="1"/>
+          </p:nvPr>
+        </p:nvSpPr>
+        <p:spPr>
+          <a:xfrm>
+            <a:off x="677334" y="2160589"/>
+            <a:ext cx="8596800" cy="3880800"/>
+          </a:xfrm>
+          <a:prstGeom prst="rect">
+            <a:avLst/>
+          </a:prstGeom>
+        </p:spPr>
+        <p:txBody>
+          <a:bodyPr spcFirstLastPara="1" wrap="square" lIns="91425" tIns="91425" rIns="91425" bIns="91425" anchor="t" anchorCtr="0">
+            <a:noAutofit/>
+          </a:bodyPr>
+          <a:lstStyle/>
+          <a:p>
+            <a:pPr marL="342900" lvl="0" indent="-251459">
+              <a:spcBef>
+                <a:spcPts val="1000"/>
+              </a:spcBef>
+              <a:spcAft>
+                <a:spcPts val="0"/>
+              </a:spcAft>
+              <a:buNone/>
+            </a:pPr>
+            <a:r>
+              <a:rPr lang="es-ES" dirty="0" err="1"/>
+              <a:t>public</a:t>
+            </a:r>
+            <a:r>
+              <a:rPr lang="es-ES" dirty="0"/>
+              <a:t> </a:t>
+            </a:r>
+            <a:r>
+              <a:rPr lang="es-ES" dirty="0" err="1"/>
+              <a:t>class</a:t>
+            </a:r>
+            <a:r>
+              <a:rPr lang="es-ES" dirty="0"/>
+              <a:t> </a:t>
+            </a:r>
+            <a:r>
+              <a:rPr lang="es-ES" dirty="0" err="1"/>
+              <a:t>Baby</a:t>
+            </a:r>
+            <a:r>
+              <a:rPr lang="es-ES" dirty="0"/>
+              <a:t> { </a:t>
+            </a:r>
+            <a:endParaRPr dirty="0"/>
+          </a:p>
+          <a:p>
+            <a:pPr marL="342900" lvl="0" indent="-251459">
+              <a:spcBef>
+                <a:spcPts val="1000"/>
+              </a:spcBef>
+              <a:spcAft>
+                <a:spcPts val="0"/>
+              </a:spcAft>
+              <a:buNone/>
+            </a:pPr>
+            <a:r>
+              <a:rPr lang="es-ES" dirty="0"/>
+              <a:t>    </a:t>
+            </a:r>
+            <a:r>
+              <a:rPr lang="es-ES" dirty="0" err="1"/>
+              <a:t>String</a:t>
+            </a:r>
+            <a:r>
+              <a:rPr lang="es-ES" dirty="0"/>
+              <a:t> </a:t>
+            </a:r>
+            <a:r>
+              <a:rPr lang="es-ES" dirty="0" err="1"/>
+              <a:t>name</a:t>
+            </a:r>
+            <a:r>
+              <a:rPr lang="es-ES" dirty="0"/>
+              <a:t>; </a:t>
+            </a:r>
+            <a:endParaRPr dirty="0"/>
+          </a:p>
+          <a:p>
+            <a:pPr marL="342900" lvl="0" indent="-251459">
+              <a:spcBef>
+                <a:spcPts val="1000"/>
+              </a:spcBef>
+              <a:spcAft>
+                <a:spcPts val="0"/>
+              </a:spcAft>
+              <a:buNone/>
+            </a:pPr>
+            <a:r>
+              <a:rPr lang="es-ES" dirty="0"/>
+              <a:t>    </a:t>
+            </a:r>
+            <a:r>
+              <a:rPr lang="es-ES" dirty="0" err="1"/>
+              <a:t>char</a:t>
+            </a:r>
+            <a:r>
+              <a:rPr lang="es-ES" dirty="0"/>
+              <a:t> sex; </a:t>
+            </a:r>
+            <a:endParaRPr dirty="0"/>
+          </a:p>
+          <a:p>
+            <a:pPr marL="342900" lvl="0" indent="-251459">
+              <a:spcBef>
+                <a:spcPts val="1000"/>
+              </a:spcBef>
+              <a:spcAft>
+                <a:spcPts val="0"/>
+              </a:spcAft>
+              <a:buNone/>
+            </a:pPr>
+            <a:r>
+              <a:rPr lang="es-ES" dirty="0"/>
+              <a:t>    </a:t>
+            </a:r>
+            <a:r>
+              <a:rPr lang="es-ES" dirty="0" err="1"/>
+              <a:t>Baby</a:t>
+            </a:r>
+            <a:r>
+              <a:rPr lang="es-ES" dirty="0"/>
+              <a:t>(</a:t>
+            </a:r>
+            <a:r>
+              <a:rPr lang="es-ES" dirty="0" err="1"/>
+              <a:t>String</a:t>
+            </a:r>
+            <a:r>
+              <a:rPr lang="es-ES" dirty="0"/>
+              <a:t> </a:t>
+            </a:r>
+            <a:r>
+              <a:rPr lang="es-ES" dirty="0" err="1"/>
+              <a:t>myMame</a:t>
+            </a:r>
+            <a:r>
+              <a:rPr lang="es-ES" dirty="0"/>
+              <a:t>, </a:t>
+            </a:r>
+            <a:r>
+              <a:rPr lang="es-ES" dirty="0" err="1"/>
+              <a:t>char</a:t>
+            </a:r>
+            <a:r>
+              <a:rPr lang="es-ES" dirty="0"/>
+              <a:t> </a:t>
+            </a:r>
+            <a:r>
+              <a:rPr lang="es-ES" dirty="0" err="1"/>
+              <a:t>babySex</a:t>
+            </a:r>
+            <a:r>
+              <a:rPr lang="es-ES" dirty="0"/>
+              <a:t>){ </a:t>
+            </a:r>
+            <a:endParaRPr dirty="0"/>
+          </a:p>
+          <a:p>
+            <a:pPr marL="342900" lvl="0" indent="-251459">
+              <a:spcBef>
+                <a:spcPts val="1000"/>
+              </a:spcBef>
+              <a:spcAft>
+                <a:spcPts val="0"/>
+              </a:spcAft>
+              <a:buNone/>
+            </a:pPr>
+            <a:r>
+              <a:rPr lang="es-ES" dirty="0"/>
+              <a:t>        </a:t>
+            </a:r>
+            <a:r>
+              <a:rPr lang="es-ES" dirty="0" err="1"/>
+              <a:t>name</a:t>
+            </a:r>
+            <a:r>
+              <a:rPr lang="es-ES" dirty="0"/>
+              <a:t> = </a:t>
+            </a:r>
+            <a:r>
+              <a:rPr lang="es-ES" dirty="0" err="1"/>
+              <a:t>myName</a:t>
+            </a:r>
+            <a:r>
+              <a:rPr lang="es-ES" dirty="0"/>
+              <a:t>; </a:t>
+            </a:r>
+            <a:endParaRPr dirty="0"/>
+          </a:p>
+          <a:p>
+            <a:pPr marL="342900" lvl="0" indent="-251459">
+              <a:spcBef>
+                <a:spcPts val="1000"/>
+              </a:spcBef>
+              <a:spcAft>
+                <a:spcPts val="0"/>
+              </a:spcAft>
+              <a:buNone/>
+            </a:pPr>
+            <a:r>
+              <a:rPr lang="es-ES" dirty="0"/>
+              <a:t>        sex = </a:t>
+            </a:r>
+            <a:r>
+              <a:rPr lang="es-ES" dirty="0" err="1"/>
+              <a:t>babySex</a:t>
+            </a:r>
+            <a:r>
+              <a:rPr lang="es-ES" dirty="0"/>
+              <a:t>; </a:t>
+            </a:r>
+            <a:endParaRPr dirty="0"/>
+          </a:p>
+          <a:p>
+            <a:pPr marL="342900" lvl="0" indent="-251459">
+              <a:spcBef>
+                <a:spcPts val="1000"/>
+              </a:spcBef>
+              <a:spcAft>
+                <a:spcPts val="0"/>
+              </a:spcAft>
+              <a:buNone/>
+            </a:pPr>
+            <a:r>
+              <a:rPr lang="es-ES" dirty="0"/>
+              <a:t>    } </a:t>
+            </a:r>
+            <a:endParaRPr dirty="0"/>
+          </a:p>
+          <a:p>
+            <a:pPr marL="342900" lvl="0" indent="-251459">
+              <a:spcBef>
+                <a:spcPts val="1000"/>
+              </a:spcBef>
+              <a:spcAft>
+                <a:spcPts val="0"/>
+              </a:spcAft>
+              <a:buNone/>
+            </a:pPr>
+            <a:r>
+              <a:rPr lang="es-ES" dirty="0"/>
+              <a:t>} </a:t>
+            </a:r>
+            <a:endParaRPr dirty="0"/>
+          </a:p>
+        </p:txBody>
+      </p:sp>
+    </p:spTree>
   </p:cSld>
   <p:clrMapOvr>
     <a:masterClrMapping/>

</xml_diff>

<commit_message>
Adds slides on encapsulation and behavior vs state
</commit_message>
<xml_diff>
--- a/slides/Selenium, Module3.pptx
+++ b/slides/Selenium, Module3.pptx
@@ -5,7 +5,7 @@
     <p:sldMasterId id="2147483664" r:id="rId1"/>
   </p:sldMasterIdLst>
   <p:notesMasterIdLst>
-    <p:notesMasterId r:id="rId22"/>
+    <p:notesMasterId r:id="rId24"/>
   </p:notesMasterIdLst>
   <p:sldIdLst>
     <p:sldId id="256" r:id="rId2"/>
@@ -27,7 +27,9 @@
     <p:sldId id="283" r:id="rId18"/>
     <p:sldId id="284" r:id="rId19"/>
     <p:sldId id="285" r:id="rId20"/>
-    <p:sldId id="276" r:id="rId21"/>
+    <p:sldId id="286" r:id="rId21"/>
+    <p:sldId id="287" r:id="rId22"/>
+    <p:sldId id="276" r:id="rId23"/>
   </p:sldIdLst>
   <p:sldSz cx="12192000" cy="6858000"/>
   <p:notesSz cx="6858000" cy="9144000"/>
@@ -1405,8 +1407,8 @@
     <dgm:cxn modelId="{11BB3522-C067-9242-A26C-55A8C2C85064}" srcId="{317D4290-9F0E-6E45-BD4F-8D620965FF8E}" destId="{A439195B-3F3D-ED41-9D29-940CE62E12A7}" srcOrd="1" destOrd="0" parTransId="{790E87FB-E36F-0146-8629-CD30963814BC}" sibTransId="{A512E7F8-CCD8-FC40-B767-12743762AF8C}"/>
     <dgm:cxn modelId="{F30F7225-17EC-BF42-A423-6187E7D460FB}" type="presOf" srcId="{4C3089A0-EB6D-5B4B-A259-7B20ADDDA396}" destId="{EA0C3F9B-88D7-1243-A672-B39627E2029C}" srcOrd="0" destOrd="0" presId="urn:microsoft.com/office/officeart/2005/8/layout/hList1"/>
     <dgm:cxn modelId="{E559242C-0FD3-5D49-ADEC-F3BFA905F8F1}" type="presOf" srcId="{91CD9079-45BE-FB49-8E78-E6DF31BD8BD2}" destId="{507B8F00-C5BA-ED44-B1CD-8442894F62CE}" srcOrd="0" destOrd="0" presId="urn:microsoft.com/office/officeart/2005/8/layout/hList1"/>
+    <dgm:cxn modelId="{01FDA369-EF6E-DD43-9272-3294F26E561C}" srcId="{23F8D2BE-7838-3D4D-9636-4B9E4A0BB0F6}" destId="{317D4290-9F0E-6E45-BD4F-8D620965FF8E}" srcOrd="1" destOrd="0" parTransId="{8B59727D-3AC0-E141-8501-723531930EEB}" sibTransId="{D237EF38-1D4C-0A45-B2B9-697FA794FC39}"/>
     <dgm:cxn modelId="{5B788B4D-2829-4749-B969-947463B3C9A5}" type="presOf" srcId="{23F8D2BE-7838-3D4D-9636-4B9E4A0BB0F6}" destId="{74F94F62-BBF2-D342-B332-2A72906536BD}" srcOrd="0" destOrd="0" presId="urn:microsoft.com/office/officeart/2005/8/layout/hList1"/>
-    <dgm:cxn modelId="{01FDA369-EF6E-DD43-9272-3294F26E561C}" srcId="{23F8D2BE-7838-3D4D-9636-4B9E4A0BB0F6}" destId="{317D4290-9F0E-6E45-BD4F-8D620965FF8E}" srcOrd="1" destOrd="0" parTransId="{8B59727D-3AC0-E141-8501-723531930EEB}" sibTransId="{D237EF38-1D4C-0A45-B2B9-697FA794FC39}"/>
     <dgm:cxn modelId="{ED4E407A-36CD-8144-A442-9A2F020C21CE}" type="presOf" srcId="{A439195B-3F3D-ED41-9D29-940CE62E12A7}" destId="{95E6ECE2-D5DE-9040-9E34-5AB0150E05CA}" srcOrd="0" destOrd="1" presId="urn:microsoft.com/office/officeart/2005/8/layout/hList1"/>
     <dgm:cxn modelId="{E7870A86-04F1-A14D-975A-2919925BAD10}" type="presOf" srcId="{E518ED7B-1E6B-0242-B1BE-3185BDEDD0B4}" destId="{95E6ECE2-D5DE-9040-9E34-5AB0150E05CA}" srcOrd="0" destOrd="0" presId="urn:microsoft.com/office/officeart/2005/8/layout/hList1"/>
     <dgm:cxn modelId="{DADA1488-8949-CF4E-8FF9-7C869452A8CD}" srcId="{91CD9079-45BE-FB49-8E78-E6DF31BD8BD2}" destId="{3CE56A54-3120-E140-B9D8-F295F05743F3}" srcOrd="2" destOrd="0" parTransId="{4AD218CD-6516-484E-8591-88C9961BDE20}" sibTransId="{44A52EBC-4375-814B-A82B-B23A709521DE}"/>
@@ -3651,8 +3653,8 @@
         </p:nvSpPr>
         <p:spPr>
           <a:xfrm>
-            <a:off x="1143225" y="685800"/>
-            <a:ext cx="4572225" cy="3429000"/>
+            <a:off x="381000" y="685800"/>
+            <a:ext cx="6096000" cy="3429000"/>
           </a:xfrm>
           <a:custGeom>
             <a:avLst/>
@@ -25715,7 +25717,7 @@
               <a:buNone/>
             </a:pPr>
             <a:r>
-              <a:rPr lang="es-ES" sz="1800" b="0" i="0" u="none" strike="noStrike" cap="none">
+              <a:rPr lang="es-ES" sz="1800" b="0" i="0" u="none" strike="noStrike" cap="none" dirty="0">
                 <a:solidFill>
                   <a:srgbClr val="7F7F7F"/>
                 </a:solidFill>
@@ -25724,13 +25726,9 @@
                 <a:cs typeface="Trebuchet MS"/>
                 <a:sym typeface="Trebuchet MS"/>
               </a:rPr>
-              <a:t>Sesión </a:t>
+              <a:t>Modulo 3</a:t>
             </a:r>
-            <a:r>
-              <a:rPr lang="es-ES"/>
-              <a:t>2</a:t>
-            </a:r>
-            <a:endParaRPr sz="1800" b="0" i="0" u="none" strike="noStrike" cap="none">
+            <a:endParaRPr sz="1800" b="0" i="0" u="none" strike="noStrike" cap="none" dirty="0">
               <a:solidFill>
                 <a:srgbClr val="7F7F7F"/>
               </a:solidFill>
@@ -27792,20 +27790,240 @@
           <a:p>
             <a:r>
               <a:rPr lang="en-MX" dirty="0"/>
-              <a:t>El estado de un objeto lo representan sus atributos</a:t>
+              <a:t>El estado de un objeto </a:t>
+            </a:r>
+            <a:endParaRPr lang="en-US" dirty="0"/>
+          </a:p>
+          <a:p>
+            <a:pPr marL="137160" indent="0">
+              <a:buNone/>
+            </a:pPr>
+            <a:r>
+              <a:rPr lang="en-US" dirty="0"/>
+              <a:t>l</a:t>
+            </a:r>
+            <a:r>
+              <a:rPr lang="en-MX" dirty="0"/>
+              <a:t>o </a:t>
+            </a:r>
+            <a:r>
+              <a:rPr lang="en-US" dirty="0" err="1"/>
+              <a:t>representa</a:t>
+            </a:r>
+            <a:r>
+              <a:rPr lang="en-US" dirty="0"/>
+              <a:t> el valor de</a:t>
+            </a:r>
+          </a:p>
+          <a:p>
+            <a:pPr marL="137160" indent="0">
+              <a:buNone/>
+            </a:pPr>
+            <a:r>
+              <a:rPr lang="en-MX" dirty="0"/>
+              <a:t>sus atributos</a:t>
             </a:r>
           </a:p>
           <a:p>
             <a:r>
-              <a:rPr lang="en-MX"/>
-              <a:t>El comportamiento lo representan sus metodos</a:t>
+              <a:rPr lang="en-MX" dirty="0"/>
+              <a:t>El comportamiento lo </a:t>
+            </a:r>
+            <a:endParaRPr lang="en-US" dirty="0"/>
+          </a:p>
+          <a:p>
+            <a:pPr marL="137160" indent="0">
+              <a:buNone/>
+            </a:pPr>
+            <a:r>
+              <a:rPr lang="en-US" dirty="0"/>
+              <a:t>r</a:t>
+            </a:r>
+            <a:r>
+              <a:rPr lang="en-MX" dirty="0"/>
+              <a:t>epresentan sus metodos</a:t>
+            </a:r>
+            <a:endParaRPr lang="en-US" dirty="0"/>
+          </a:p>
+          <a:p>
+            <a:r>
+              <a:rPr lang="en-US" dirty="0" err="1"/>
+              <a:t>Cada</a:t>
+            </a:r>
+            <a:r>
+              <a:rPr lang="en-US" dirty="0"/>
+              <a:t> </a:t>
+            </a:r>
+            <a:r>
+              <a:rPr lang="en-US" dirty="0" err="1"/>
+              <a:t>vez</a:t>
+            </a:r>
+            <a:r>
+              <a:rPr lang="en-US" dirty="0"/>
+              <a:t> que se </a:t>
+            </a:r>
+            <a:r>
+              <a:rPr lang="en-US" dirty="0" err="1"/>
+              <a:t>llaman</a:t>
+            </a:r>
+            <a:r>
+              <a:rPr lang="en-US" dirty="0"/>
+              <a:t> </a:t>
             </a:r>
           </a:p>
           <a:p>
-            <a:endParaRPr lang="en-MX"/>
+            <a:pPr marL="137160" indent="0">
+              <a:buNone/>
+            </a:pPr>
+            <a:r>
+              <a:rPr lang="en-US" dirty="0"/>
+              <a:t>los </a:t>
+            </a:r>
+            <a:r>
+              <a:rPr lang="en-US" dirty="0" err="1"/>
+              <a:t>metodos</a:t>
+            </a:r>
+            <a:r>
+              <a:rPr lang="en-US" dirty="0"/>
+              <a:t>, se </a:t>
+            </a:r>
+            <a:r>
+              <a:rPr lang="en-US" dirty="0" err="1"/>
+              <a:t>modifican</a:t>
+            </a:r>
+            <a:r>
+              <a:rPr lang="en-US" dirty="0"/>
+              <a:t> </a:t>
+            </a:r>
+          </a:p>
+          <a:p>
+            <a:pPr marL="137160" indent="0">
+              <a:buNone/>
+            </a:pPr>
+            <a:r>
+              <a:rPr lang="en-US" dirty="0"/>
+              <a:t>las variables</a:t>
+            </a:r>
+          </a:p>
+          <a:p>
+            <a:r>
+              <a:rPr lang="en-US" dirty="0"/>
+              <a:t>El </a:t>
+            </a:r>
+            <a:r>
+              <a:rPr lang="en-US" dirty="0" err="1"/>
+              <a:t>estado</a:t>
+            </a:r>
+            <a:r>
+              <a:rPr lang="en-US" dirty="0"/>
+              <a:t> de un </a:t>
+            </a:r>
+            <a:r>
+              <a:rPr lang="en-US" dirty="0" err="1"/>
+              <a:t>objeto</a:t>
+            </a:r>
+            <a:r>
+              <a:rPr lang="en-US" dirty="0"/>
+              <a:t> </a:t>
+            </a:r>
+          </a:p>
+          <a:p>
+            <a:pPr marL="137160" indent="0">
+              <a:buNone/>
+            </a:pPr>
+            <a:r>
+              <a:rPr lang="en-US" dirty="0" err="1"/>
+              <a:t>modifica</a:t>
+            </a:r>
+            <a:r>
+              <a:rPr lang="en-US" dirty="0"/>
+              <a:t> </a:t>
+            </a:r>
+            <a:r>
+              <a:rPr lang="en-US" dirty="0" err="1"/>
+              <a:t>su</a:t>
+            </a:r>
+            <a:r>
+              <a:rPr lang="en-US" dirty="0"/>
+              <a:t> </a:t>
+            </a:r>
+            <a:r>
+              <a:rPr lang="en-US" dirty="0" err="1"/>
+              <a:t>comportamiento</a:t>
+            </a:r>
+            <a:endParaRPr lang="en-US" dirty="0"/>
+          </a:p>
+          <a:p>
+            <a:pPr marL="137160" indent="0">
+              <a:buNone/>
+            </a:pPr>
+            <a:endParaRPr lang="en-MX" dirty="0"/>
+          </a:p>
+          <a:p>
+            <a:endParaRPr lang="en-MX" dirty="0"/>
           </a:p>
         </p:txBody>
       </p:sp>
+      <p:pic>
+        <p:nvPicPr>
+          <p:cNvPr id="5" name="Picture 4" descr="Cuando el nivel de hambre es alto, el comportamiento se altera">
+            <a:extLst>
+              <a:ext uri="{FF2B5EF4-FFF2-40B4-BE49-F238E27FC236}">
+                <a16:creationId xmlns:a16="http://schemas.microsoft.com/office/drawing/2014/main" id="{E93497A6-D14E-4DC1-A7D8-F1569C569DEA}"/>
+              </a:ext>
+            </a:extLst>
+          </p:cNvPr>
+          <p:cNvPicPr>
+            <a:picLocks noChangeAspect="1"/>
+          </p:cNvPicPr>
+          <p:nvPr/>
+        </p:nvPicPr>
+        <p:blipFill>
+          <a:blip r:embed="rId2"/>
+          <a:stretch>
+            <a:fillRect/>
+          </a:stretch>
+        </p:blipFill>
+        <p:spPr>
+          <a:xfrm>
+            <a:off x="7093853" y="1101756"/>
+            <a:ext cx="3499119" cy="2432473"/>
+          </a:xfrm>
+          <a:prstGeom prst="rect">
+            <a:avLst/>
+          </a:prstGeom>
+        </p:spPr>
+      </p:pic>
+      <p:pic>
+        <p:nvPicPr>
+          <p:cNvPr id="7" name="Picture 6" descr="A person holding a plate of food&#10;&#10;Description automatically generated">
+            <a:extLst>
+              <a:ext uri="{FF2B5EF4-FFF2-40B4-BE49-F238E27FC236}">
+                <a16:creationId xmlns:a16="http://schemas.microsoft.com/office/drawing/2014/main" id="{893FCF9C-6AE5-437C-BFED-F130276F7AA3}"/>
+              </a:ext>
+            </a:extLst>
+          </p:cNvPr>
+          <p:cNvPicPr>
+            <a:picLocks noChangeAspect="1"/>
+          </p:cNvPicPr>
+          <p:nvPr/>
+        </p:nvPicPr>
+        <p:blipFill>
+          <a:blip r:embed="rId3"/>
+          <a:stretch>
+            <a:fillRect/>
+          </a:stretch>
+        </p:blipFill>
+        <p:spPr>
+          <a:xfrm>
+            <a:off x="4814886" y="3764418"/>
+            <a:ext cx="3728709" cy="3052129"/>
+          </a:xfrm>
+          <a:prstGeom prst="rect">
+            <a:avLst/>
+          </a:prstGeom>
+        </p:spPr>
+      </p:pic>
     </p:spTree>
     <p:extLst>
       <p:ext uri="{BB962C8B-B14F-4D97-AF65-F5344CB8AC3E}">
@@ -27906,6 +28124,557 @@
 </file>
 
 <file path=ppt/slides/slide20.xml><?xml version="1.0" encoding="utf-8"?>
+<p:sld xmlns:a="http://schemas.openxmlformats.org/drawingml/2006/main" xmlns:r="http://schemas.openxmlformats.org/officeDocument/2006/relationships" xmlns:p="http://schemas.openxmlformats.org/presentationml/2006/main">
+  <p:cSld>
+    <p:spTree>
+      <p:nvGrpSpPr>
+        <p:cNvPr id="1" name=""/>
+        <p:cNvGrpSpPr/>
+        <p:nvPr/>
+      </p:nvGrpSpPr>
+      <p:grpSpPr>
+        <a:xfrm>
+          <a:off x="0" y="0"/>
+          <a:ext cx="0" cy="0"/>
+          <a:chOff x="0" y="0"/>
+          <a:chExt cx="0" cy="0"/>
+        </a:xfrm>
+      </p:grpSpPr>
+      <p:sp>
+        <p:nvSpPr>
+          <p:cNvPr id="2" name="Title 1">
+            <a:extLst>
+              <a:ext uri="{FF2B5EF4-FFF2-40B4-BE49-F238E27FC236}">
+                <a16:creationId xmlns:a16="http://schemas.microsoft.com/office/drawing/2014/main" id="{DD8A8781-3505-41AF-A53F-B652E4322E00}"/>
+              </a:ext>
+            </a:extLst>
+          </p:cNvPr>
+          <p:cNvSpPr>
+            <a:spLocks noGrp="1"/>
+          </p:cNvSpPr>
+          <p:nvPr>
+            <p:ph type="title"/>
+          </p:nvPr>
+        </p:nvSpPr>
+        <p:spPr/>
+        <p:txBody>
+          <a:bodyPr/>
+          <a:lstStyle/>
+          <a:p>
+            <a:r>
+              <a:rPr lang="en-US" dirty="0" err="1"/>
+              <a:t>Comportamiento</a:t>
+            </a:r>
+            <a:r>
+              <a:rPr lang="en-US" dirty="0"/>
+              <a:t> de </a:t>
+            </a:r>
+            <a:r>
+              <a:rPr lang="en-US" dirty="0" err="1"/>
+              <a:t>Objetos</a:t>
+            </a:r>
+            <a:endParaRPr lang="en-US" dirty="0"/>
+          </a:p>
+        </p:txBody>
+      </p:sp>
+      <p:sp>
+        <p:nvSpPr>
+          <p:cNvPr id="3" name="Text Placeholder 2">
+            <a:extLst>
+              <a:ext uri="{FF2B5EF4-FFF2-40B4-BE49-F238E27FC236}">
+                <a16:creationId xmlns:a16="http://schemas.microsoft.com/office/drawing/2014/main" id="{EE5C57CA-61F1-4F95-8890-ABA7FCA97FE7}"/>
+              </a:ext>
+            </a:extLst>
+          </p:cNvPr>
+          <p:cNvSpPr>
+            <a:spLocks noGrp="1"/>
+          </p:cNvSpPr>
+          <p:nvPr>
+            <p:ph type="body" idx="1"/>
+          </p:nvPr>
+        </p:nvSpPr>
+        <p:spPr/>
+        <p:txBody>
+          <a:bodyPr/>
+          <a:lstStyle/>
+          <a:p>
+            <a:r>
+              <a:rPr lang="en-US" dirty="0" err="1"/>
+              <a:t>Objetos</a:t>
+            </a:r>
+            <a:r>
+              <a:rPr lang="en-US" dirty="0"/>
+              <a:t> de la </a:t>
+            </a:r>
+            <a:r>
+              <a:rPr lang="en-US" dirty="0" err="1"/>
+              <a:t>misma</a:t>
+            </a:r>
+            <a:r>
+              <a:rPr lang="en-US" dirty="0"/>
+              <a:t> </a:t>
+            </a:r>
+            <a:r>
+              <a:rPr lang="en-US" dirty="0" err="1"/>
+              <a:t>clase</a:t>
+            </a:r>
+            <a:r>
+              <a:rPr lang="en-US" dirty="0"/>
+              <a:t> se </a:t>
+            </a:r>
+            <a:r>
+              <a:rPr lang="en-US" dirty="0" err="1"/>
+              <a:t>comportan</a:t>
+            </a:r>
+            <a:r>
+              <a:rPr lang="en-US" dirty="0"/>
+              <a:t> de </a:t>
+            </a:r>
+            <a:r>
+              <a:rPr lang="en-US" dirty="0" err="1"/>
+              <a:t>manera</a:t>
+            </a:r>
+            <a:r>
+              <a:rPr lang="en-US" dirty="0"/>
+              <a:t> </a:t>
+            </a:r>
+            <a:r>
+              <a:rPr lang="en-US" dirty="0" err="1"/>
+              <a:t>diferente</a:t>
+            </a:r>
+            <a:endParaRPr lang="en-US" dirty="0"/>
+          </a:p>
+          <a:p>
+            <a:r>
+              <a:rPr lang="en-US" dirty="0" err="1"/>
+              <a:t>Diferencias</a:t>
+            </a:r>
+            <a:r>
+              <a:rPr lang="en-US" dirty="0"/>
+              <a:t> de </a:t>
+            </a:r>
+            <a:r>
+              <a:rPr lang="en-US" dirty="0" err="1"/>
+              <a:t>comportamiento</a:t>
+            </a:r>
+            <a:r>
+              <a:rPr lang="en-US" dirty="0"/>
+              <a:t>?</a:t>
+            </a:r>
+          </a:p>
+          <a:p>
+            <a:r>
+              <a:rPr lang="en-US" dirty="0" err="1"/>
+              <a:t>pug.ladrar</a:t>
+            </a:r>
+            <a:r>
+              <a:rPr lang="en-US" dirty="0"/>
+              <a:t>()</a:t>
+            </a:r>
+          </a:p>
+          <a:p>
+            <a:r>
+              <a:rPr lang="en-US" dirty="0" err="1"/>
+              <a:t>labrador.ladrar</a:t>
+            </a:r>
+            <a:r>
+              <a:rPr lang="en-US" dirty="0"/>
+              <a:t>() </a:t>
+            </a:r>
+          </a:p>
+          <a:p>
+            <a:r>
+              <a:rPr lang="en-US" dirty="0" err="1"/>
+              <a:t>granDanes.ladrar</a:t>
+            </a:r>
+            <a:r>
+              <a:rPr lang="en-US" dirty="0"/>
+              <a:t>()</a:t>
+            </a:r>
+          </a:p>
+        </p:txBody>
+      </p:sp>
+      <p:pic>
+        <p:nvPicPr>
+          <p:cNvPr id="11" name="Picture 10" descr="A brown and white dog looking at the camera&#10;&#10;Description automatically generated">
+            <a:extLst>
+              <a:ext uri="{FF2B5EF4-FFF2-40B4-BE49-F238E27FC236}">
+                <a16:creationId xmlns:a16="http://schemas.microsoft.com/office/drawing/2014/main" id="{40B8BE7B-6569-4740-8138-06C764164C8D}"/>
+              </a:ext>
+            </a:extLst>
+          </p:cNvPr>
+          <p:cNvPicPr>
+            <a:picLocks noChangeAspect="1"/>
+          </p:cNvPicPr>
+          <p:nvPr/>
+        </p:nvPicPr>
+        <p:blipFill>
+          <a:blip r:embed="rId2"/>
+          <a:stretch>
+            <a:fillRect/>
+          </a:stretch>
+        </p:blipFill>
+        <p:spPr>
+          <a:xfrm>
+            <a:off x="8015360" y="1130300"/>
+            <a:ext cx="2857500" cy="1600200"/>
+          </a:xfrm>
+          <a:prstGeom prst="rect">
+            <a:avLst/>
+          </a:prstGeom>
+        </p:spPr>
+      </p:pic>
+      <p:pic>
+        <p:nvPicPr>
+          <p:cNvPr id="13" name="Picture 12" descr="A large brown dog lying on the ground&#10;&#10;Description automatically generated">
+            <a:extLst>
+              <a:ext uri="{FF2B5EF4-FFF2-40B4-BE49-F238E27FC236}">
+                <a16:creationId xmlns:a16="http://schemas.microsoft.com/office/drawing/2014/main" id="{046CA1E1-94D2-4119-ACCA-5E0C6E664F3C}"/>
+              </a:ext>
+            </a:extLst>
+          </p:cNvPr>
+          <p:cNvPicPr>
+            <a:picLocks noChangeAspect="1"/>
+          </p:cNvPicPr>
+          <p:nvPr/>
+        </p:nvPicPr>
+        <p:blipFill>
+          <a:blip r:embed="rId3"/>
+          <a:stretch>
+            <a:fillRect/>
+          </a:stretch>
+        </p:blipFill>
+        <p:spPr>
+          <a:xfrm>
+            <a:off x="4607756" y="3767504"/>
+            <a:ext cx="2667000" cy="1714500"/>
+          </a:xfrm>
+          <a:prstGeom prst="rect">
+            <a:avLst/>
+          </a:prstGeom>
+        </p:spPr>
+      </p:pic>
+      <p:pic>
+        <p:nvPicPr>
+          <p:cNvPr id="15" name="Picture 14" descr="A brown and white dog standing in the dirt&#10;&#10;Description automatically generated">
+            <a:extLst>
+              <a:ext uri="{FF2B5EF4-FFF2-40B4-BE49-F238E27FC236}">
+                <a16:creationId xmlns:a16="http://schemas.microsoft.com/office/drawing/2014/main" id="{1C87A046-FA13-40E8-AED2-17F8B4D36BFA}"/>
+              </a:ext>
+            </a:extLst>
+          </p:cNvPr>
+          <p:cNvPicPr>
+            <a:picLocks noChangeAspect="1"/>
+          </p:cNvPicPr>
+          <p:nvPr/>
+        </p:nvPicPr>
+        <p:blipFill>
+          <a:blip r:embed="rId4"/>
+          <a:stretch>
+            <a:fillRect/>
+          </a:stretch>
+        </p:blipFill>
+        <p:spPr>
+          <a:xfrm>
+            <a:off x="8116985" y="3223807"/>
+            <a:ext cx="1838325" cy="2486025"/>
+          </a:xfrm>
+          <a:prstGeom prst="rect">
+            <a:avLst/>
+          </a:prstGeom>
+        </p:spPr>
+      </p:pic>
+    </p:spTree>
+    <p:extLst>
+      <p:ext uri="{BB962C8B-B14F-4D97-AF65-F5344CB8AC3E}">
+        <p14:creationId xmlns:p14="http://schemas.microsoft.com/office/powerpoint/2010/main" val="2488878483"/>
+      </p:ext>
+    </p:extLst>
+  </p:cSld>
+  <p:clrMapOvr>
+    <a:masterClrMapping/>
+  </p:clrMapOvr>
+</p:sld>
+</file>
+
+<file path=ppt/slides/slide21.xml><?xml version="1.0" encoding="utf-8"?>
+<p:sld xmlns:a="http://schemas.openxmlformats.org/drawingml/2006/main" xmlns:r="http://schemas.openxmlformats.org/officeDocument/2006/relationships" xmlns:p="http://schemas.openxmlformats.org/presentationml/2006/main">
+  <p:cSld>
+    <p:spTree>
+      <p:nvGrpSpPr>
+        <p:cNvPr id="1" name=""/>
+        <p:cNvGrpSpPr/>
+        <p:nvPr/>
+      </p:nvGrpSpPr>
+      <p:grpSpPr>
+        <a:xfrm>
+          <a:off x="0" y="0"/>
+          <a:ext cx="0" cy="0"/>
+          <a:chOff x="0" y="0"/>
+          <a:chExt cx="0" cy="0"/>
+        </a:xfrm>
+      </p:grpSpPr>
+      <p:sp>
+        <p:nvSpPr>
+          <p:cNvPr id="2" name="Title 1">
+            <a:extLst>
+              <a:ext uri="{FF2B5EF4-FFF2-40B4-BE49-F238E27FC236}">
+                <a16:creationId xmlns:a16="http://schemas.microsoft.com/office/drawing/2014/main" id="{959C9BD7-726B-4CCE-8B53-17FD8603ABFF}"/>
+              </a:ext>
+            </a:extLst>
+          </p:cNvPr>
+          <p:cNvSpPr>
+            <a:spLocks noGrp="1"/>
+          </p:cNvSpPr>
+          <p:nvPr>
+            <p:ph type="title"/>
+          </p:nvPr>
+        </p:nvSpPr>
+        <p:spPr/>
+        <p:txBody>
+          <a:bodyPr/>
+          <a:lstStyle/>
+          <a:p>
+            <a:r>
+              <a:rPr lang="en-US" dirty="0" err="1"/>
+              <a:t>Encapsulacion</a:t>
+            </a:r>
+            <a:endParaRPr lang="en-US" dirty="0"/>
+          </a:p>
+        </p:txBody>
+      </p:sp>
+      <p:sp>
+        <p:nvSpPr>
+          <p:cNvPr id="3" name="Text Placeholder 2">
+            <a:extLst>
+              <a:ext uri="{FF2B5EF4-FFF2-40B4-BE49-F238E27FC236}">
+                <a16:creationId xmlns:a16="http://schemas.microsoft.com/office/drawing/2014/main" id="{5EF96A99-66A8-4C7D-BA98-7DA1F128CFD5}"/>
+              </a:ext>
+            </a:extLst>
+          </p:cNvPr>
+          <p:cNvSpPr>
+            <a:spLocks noGrp="1"/>
+          </p:cNvSpPr>
+          <p:nvPr>
+            <p:ph type="body" idx="1"/>
+          </p:nvPr>
+        </p:nvSpPr>
+        <p:spPr/>
+        <p:txBody>
+          <a:bodyPr/>
+          <a:lstStyle/>
+          <a:p>
+            <a:r>
+              <a:rPr lang="en-US" dirty="0"/>
+              <a:t>Evita </a:t>
+            </a:r>
+            <a:r>
+              <a:rPr lang="en-US" dirty="0" err="1"/>
+              <a:t>exponer</a:t>
+            </a:r>
+            <a:r>
+              <a:rPr lang="en-US" dirty="0"/>
+              <a:t> </a:t>
+            </a:r>
+            <a:r>
+              <a:rPr lang="en-US" dirty="0" err="1"/>
+              <a:t>atributos</a:t>
+            </a:r>
+            <a:r>
+              <a:rPr lang="en-US" dirty="0"/>
+              <a:t> de </a:t>
+            </a:r>
+            <a:r>
+              <a:rPr lang="en-US" dirty="0" err="1"/>
+              <a:t>clase</a:t>
+            </a:r>
+            <a:endParaRPr lang="en-US" dirty="0"/>
+          </a:p>
+          <a:p>
+            <a:r>
+              <a:rPr lang="en-US" dirty="0" err="1"/>
+              <a:t>Previene</a:t>
+            </a:r>
+            <a:r>
+              <a:rPr lang="en-US" dirty="0"/>
+              <a:t> </a:t>
+            </a:r>
+            <a:r>
+              <a:rPr lang="en-US" dirty="0" err="1"/>
+              <a:t>estado</a:t>
+            </a:r>
+            <a:r>
+              <a:rPr lang="en-US" dirty="0"/>
+              <a:t> </a:t>
+            </a:r>
+            <a:r>
+              <a:rPr lang="en-US" dirty="0" err="1"/>
+              <a:t>incongruente</a:t>
+            </a:r>
+            <a:r>
+              <a:rPr lang="en-US" dirty="0"/>
+              <a:t> de </a:t>
+            </a:r>
+            <a:r>
+              <a:rPr lang="en-US" dirty="0" err="1"/>
+              <a:t>objetos</a:t>
+            </a:r>
+            <a:endParaRPr lang="en-US" dirty="0"/>
+          </a:p>
+          <a:p>
+            <a:r>
+              <a:rPr lang="en-US" dirty="0"/>
+              <a:t>Ex.  </a:t>
+            </a:r>
+            <a:r>
+              <a:rPr lang="en-US" dirty="0" err="1"/>
+              <a:t>pug.tamanio</a:t>
+            </a:r>
+            <a:r>
+              <a:rPr lang="en-US" dirty="0"/>
+              <a:t> = -13.5;</a:t>
+            </a:r>
+          </a:p>
+          <a:p>
+            <a:r>
+              <a:rPr lang="en-US" dirty="0" err="1"/>
+              <a:t>Utiliza</a:t>
+            </a:r>
+            <a:r>
+              <a:rPr lang="en-US" dirty="0"/>
+              <a:t> </a:t>
+            </a:r>
+            <a:r>
+              <a:rPr lang="en-US" dirty="0" err="1"/>
+              <a:t>metodos</a:t>
+            </a:r>
+            <a:r>
+              <a:rPr lang="en-US" dirty="0"/>
+              <a:t> get/set</a:t>
+            </a:r>
+          </a:p>
+          <a:p>
+            <a:r>
+              <a:rPr lang="en-US" dirty="0" err="1"/>
+              <a:t>Implementa</a:t>
+            </a:r>
+            <a:r>
+              <a:rPr lang="en-US" dirty="0"/>
+              <a:t> </a:t>
+            </a:r>
+            <a:r>
+              <a:rPr lang="en-US" dirty="0" err="1"/>
+              <a:t>modificadores</a:t>
+            </a:r>
+            <a:r>
+              <a:rPr lang="en-US" dirty="0"/>
+              <a:t> de </a:t>
+            </a:r>
+            <a:r>
+              <a:rPr lang="en-US" dirty="0" err="1"/>
+              <a:t>acceso</a:t>
+            </a:r>
+            <a:endParaRPr lang="en-US" dirty="0"/>
+          </a:p>
+          <a:p>
+            <a:pPr lvl="1"/>
+            <a:r>
+              <a:rPr lang="en-US" dirty="0"/>
+              <a:t>privado</a:t>
+            </a:r>
+          </a:p>
+          <a:p>
+            <a:pPr lvl="1"/>
+            <a:r>
+              <a:rPr lang="en-US" dirty="0" err="1"/>
+              <a:t>protegido</a:t>
+            </a:r>
+            <a:endParaRPr lang="en-US" dirty="0"/>
+          </a:p>
+          <a:p>
+            <a:pPr lvl="1"/>
+            <a:r>
+              <a:rPr lang="en-US" dirty="0" err="1"/>
+              <a:t>publico</a:t>
+            </a:r>
+            <a:endParaRPr lang="en-US" dirty="0"/>
+          </a:p>
+        </p:txBody>
+      </p:sp>
+      <p:pic>
+        <p:nvPicPr>
+          <p:cNvPr id="5" name="Picture 4" descr="protected access modifier">
+            <a:extLst>
+              <a:ext uri="{FF2B5EF4-FFF2-40B4-BE49-F238E27FC236}">
+                <a16:creationId xmlns:a16="http://schemas.microsoft.com/office/drawing/2014/main" id="{1C807C18-0F4B-416E-98E8-E0979F9F8858}"/>
+              </a:ext>
+            </a:extLst>
+          </p:cNvPr>
+          <p:cNvPicPr>
+            <a:picLocks noChangeAspect="1"/>
+          </p:cNvPicPr>
+          <p:nvPr/>
+        </p:nvPicPr>
+        <p:blipFill>
+          <a:blip r:embed="rId2"/>
+          <a:stretch>
+            <a:fillRect/>
+          </a:stretch>
+        </p:blipFill>
+        <p:spPr>
+          <a:xfrm>
+            <a:off x="5547044" y="1767620"/>
+            <a:ext cx="1743075" cy="2619375"/>
+          </a:xfrm>
+          <a:prstGeom prst="rect">
+            <a:avLst/>
+          </a:prstGeom>
+        </p:spPr>
+      </p:pic>
+      <p:pic>
+        <p:nvPicPr>
+          <p:cNvPr id="7" name="Picture 6" descr="private access modifier">
+            <a:extLst>
+              <a:ext uri="{FF2B5EF4-FFF2-40B4-BE49-F238E27FC236}">
+                <a16:creationId xmlns:a16="http://schemas.microsoft.com/office/drawing/2014/main" id="{26841B86-45DA-4A1B-BE24-2721F2C2813B}"/>
+              </a:ext>
+            </a:extLst>
+          </p:cNvPr>
+          <p:cNvPicPr>
+            <a:picLocks noChangeAspect="1"/>
+          </p:cNvPicPr>
+          <p:nvPr/>
+        </p:nvPicPr>
+        <p:blipFill>
+          <a:blip r:embed="rId3"/>
+          <a:stretch>
+            <a:fillRect/>
+          </a:stretch>
+        </p:blipFill>
+        <p:spPr>
+          <a:xfrm>
+            <a:off x="7135486" y="1308686"/>
+            <a:ext cx="2645177" cy="3535900"/>
+          </a:xfrm>
+          <a:prstGeom prst="rect">
+            <a:avLst/>
+          </a:prstGeom>
+        </p:spPr>
+      </p:pic>
+    </p:spTree>
+    <p:extLst>
+      <p:ext uri="{BB962C8B-B14F-4D97-AF65-F5344CB8AC3E}">
+        <p14:creationId xmlns:p14="http://schemas.microsoft.com/office/powerpoint/2010/main" val="3738034615"/>
+      </p:ext>
+    </p:extLst>
+  </p:cSld>
+  <p:clrMapOvr>
+    <a:masterClrMapping/>
+  </p:clrMapOvr>
+</p:sld>
+</file>
+
+<file path=ppt/slides/slide22.xml><?xml version="1.0" encoding="utf-8"?>
 <p:sld xmlns:a="http://schemas.openxmlformats.org/drawingml/2006/main" xmlns:r="http://schemas.openxmlformats.org/officeDocument/2006/relationships" xmlns:p="http://schemas.openxmlformats.org/presentationml/2006/main">
   <p:cSld>
     <p:spTree>

</xml_diff>